<commit_message>
Deleted some unnecessary things
</commit_message>
<xml_diff>
--- a/SEO_PPT.pptx
+++ b/SEO_PPT.pptx
@@ -264,6 +264,11 @@
       </a:defRPr>
     </a:lvl9pPr>
   </p:defaultTextStyle>
+  <p:extLst>
+    <p:ext uri="{EFAFB233-063F-42B5-8137-9DF3F51BA10A}">
+      <p15:sldGuideLst xmlns:p15="http://schemas.microsoft.com/office/powerpoint/2012/main"/>
+    </p:ext>
+  </p:extLst>
 </p:presentation>
 </file>
 
@@ -879,8 +884,8 @@
         </p:nvSpPr>
         <p:spPr>
           <a:xfrm>
-            <a:off x="1143225" y="685800"/>
-            <a:ext cx="4572225" cy="3429000"/>
+            <a:off x="381000" y="685800"/>
+            <a:ext cx="6096000" cy="3429000"/>
           </a:xfrm>
           <a:custGeom>
             <a:avLst/>
@@ -7416,16 +7421,16 @@
               <a:buNone/>
             </a:pPr>
             <a:r>
-              <a:rPr lang="en-US">
+              <a:rPr lang="en-US" dirty="0">
                 <a:solidFill>
-                  <a:srgbClr val="0000FF"/>
+                  <a:schemeClr val="tx1"/>
                 </a:solidFill>
               </a:rPr>
-              <a:t>TEAM BUDDIES:</a:t>
+              <a:t>TEAM:</a:t>
             </a:r>
-            <a:endParaRPr>
+            <a:endParaRPr dirty="0">
               <a:solidFill>
-                <a:srgbClr val="0000FF"/>
+                <a:schemeClr val="tx1"/>
               </a:solidFill>
             </a:endParaRPr>
           </a:p>
@@ -8260,7 +8265,7 @@
                   <a:schemeClr val="lt1"/>
                 </a:solidFill>
               </a:rPr>
-              <a:t>Our mission is to embark on a coding odyssey, crafting the "SEO Keyword Tracker and Analyzer," a dynamic tool geared towards both tracking and meticulously analyzing SEO keywords for a specific website. </a:t>
+              <a:t>Our mission is to embark on a coding odyssey, crafting the "SEO Insight Pro“, a dynamic tool geared towards both tracking and meticulously analyzing SEO keywords for a specific website. </a:t>
             </a:r>
             <a:endParaRPr lang="en-US" dirty="0">
               <a:solidFill>
@@ -8488,14 +8493,14 @@
               <a:buNone/>
             </a:pPr>
             <a:br>
-              <a:rPr lang="en-US">
+              <a:rPr lang="en-US" dirty="0">
                 <a:solidFill>
                   <a:schemeClr val="lt1"/>
                 </a:solidFill>
               </a:rPr>
             </a:br>
             <a:r>
-              <a:rPr lang="en-US" b="0" i="0">
+              <a:rPr lang="en-US" b="0" i="0" dirty="0">
                 <a:solidFill>
                   <a:schemeClr val="lt1"/>
                 </a:solidFill>
@@ -8507,7 +8512,7 @@
               <a:t>Utilizes </a:t>
             </a:r>
             <a:r>
-              <a:rPr lang="en-US">
+              <a:rPr lang="en-US" dirty="0">
                 <a:solidFill>
                   <a:schemeClr val="lt1"/>
                 </a:solidFill>
@@ -8519,7 +8524,7 @@
               <a:t>Rabin Karp, Suffix Tree, Suffix Array, Naive</a:t>
             </a:r>
             <a:r>
-              <a:rPr lang="en-US" b="0" i="0">
+              <a:rPr lang="en-US" b="0" i="0" dirty="0">
                 <a:solidFill>
                   <a:schemeClr val="lt1"/>
                 </a:solidFill>
@@ -8531,7 +8536,7 @@
               <a:t> String </a:t>
             </a:r>
             <a:r>
-              <a:rPr lang="en-US">
+              <a:rPr lang="en-US" dirty="0">
                 <a:solidFill>
                   <a:schemeClr val="lt1"/>
                 </a:solidFill>
@@ -8543,7 +8548,7 @@
               <a:t>matching</a:t>
             </a:r>
             <a:r>
-              <a:rPr lang="en-US" b="0" i="0">
+              <a:rPr lang="en-US" b="0" i="0" dirty="0">
                 <a:solidFill>
                   <a:schemeClr val="lt1"/>
                 </a:solidFill>
@@ -8552,10 +8557,34 @@
                 <a:cs typeface="Arial"/>
                 <a:sym typeface="Arial"/>
               </a:rPr>
-              <a:t>, Kmp Algorithm for </a:t>
+              <a:t>, </a:t>
             </a:r>
             <a:r>
-              <a:rPr lang="en-US">
+              <a:rPr lang="en-US" b="0" i="0" dirty="0" err="1">
+                <a:solidFill>
+                  <a:schemeClr val="lt1"/>
+                </a:solidFill>
+                <a:latin typeface="Arial"/>
+                <a:ea typeface="Arial"/>
+                <a:cs typeface="Arial"/>
+                <a:sym typeface="Arial"/>
+              </a:rPr>
+              <a:t>Kmp</a:t>
+            </a:r>
+            <a:r>
+              <a:rPr lang="en-US" b="0" i="0" dirty="0">
+                <a:solidFill>
+                  <a:schemeClr val="lt1"/>
+                </a:solidFill>
+                <a:latin typeface="Arial"/>
+                <a:ea typeface="Arial"/>
+                <a:cs typeface="Arial"/>
+                <a:sym typeface="Arial"/>
+              </a:rPr>
+              <a:t> Algorithm for </a:t>
+            </a:r>
+            <a:r>
+              <a:rPr lang="en-US" dirty="0">
                 <a:solidFill>
                   <a:schemeClr val="lt1"/>
                 </a:solidFill>
@@ -8567,7 +8596,7 @@
               <a:t>search engine optimization</a:t>
             </a:r>
             <a:r>
-              <a:rPr lang="en-US" b="0" i="0">
+              <a:rPr lang="en-US" b="0" i="0" dirty="0">
                 <a:solidFill>
                   <a:schemeClr val="lt1"/>
                 </a:solidFill>
@@ -8578,7 +8607,7 @@
               </a:rPr>
               <a:t>.</a:t>
             </a:r>
-            <a:endParaRPr>
+            <a:endParaRPr dirty="0">
               <a:solidFill>
                 <a:schemeClr val="lt1"/>
               </a:solidFill>

</xml_diff>